<commit_message>
new figures and changes
</commit_message>
<xml_diff>
--- a/figures/multipanel.pptx
+++ b/figures/multipanel.pptx
@@ -243,7 +243,7 @@
           <a:p>
             <a:fld id="{577C0138-7A75-8149-9F79-A385D49B39ED}" type="datetimeFigureOut">
               <a:rPr lang="en-US" smtClean="0"/>
-              <a:t>4/18/20</a:t>
+              <a:t>4/19/20</a:t>
             </a:fld>
             <a:endParaRPr lang="en-US"/>
           </a:p>
@@ -413,7 +413,7 @@
           <a:p>
             <a:fld id="{577C0138-7A75-8149-9F79-A385D49B39ED}" type="datetimeFigureOut">
               <a:rPr lang="en-US" smtClean="0"/>
-              <a:t>4/18/20</a:t>
+              <a:t>4/19/20</a:t>
             </a:fld>
             <a:endParaRPr lang="en-US"/>
           </a:p>
@@ -593,7 +593,7 @@
           <a:p>
             <a:fld id="{577C0138-7A75-8149-9F79-A385D49B39ED}" type="datetimeFigureOut">
               <a:rPr lang="en-US" smtClean="0"/>
-              <a:t>4/18/20</a:t>
+              <a:t>4/19/20</a:t>
             </a:fld>
             <a:endParaRPr lang="en-US"/>
           </a:p>
@@ -763,7 +763,7 @@
           <a:p>
             <a:fld id="{577C0138-7A75-8149-9F79-A385D49B39ED}" type="datetimeFigureOut">
               <a:rPr lang="en-US" smtClean="0"/>
-              <a:t>4/18/20</a:t>
+              <a:t>4/19/20</a:t>
             </a:fld>
             <a:endParaRPr lang="en-US"/>
           </a:p>
@@ -1007,7 +1007,7 @@
           <a:p>
             <a:fld id="{577C0138-7A75-8149-9F79-A385D49B39ED}" type="datetimeFigureOut">
               <a:rPr lang="en-US" smtClean="0"/>
-              <a:t>4/18/20</a:t>
+              <a:t>4/19/20</a:t>
             </a:fld>
             <a:endParaRPr lang="en-US"/>
           </a:p>
@@ -1239,7 +1239,7 @@
           <a:p>
             <a:fld id="{577C0138-7A75-8149-9F79-A385D49B39ED}" type="datetimeFigureOut">
               <a:rPr lang="en-US" smtClean="0"/>
-              <a:t>4/18/20</a:t>
+              <a:t>4/19/20</a:t>
             </a:fld>
             <a:endParaRPr lang="en-US"/>
           </a:p>
@@ -1606,7 +1606,7 @@
           <a:p>
             <a:fld id="{577C0138-7A75-8149-9F79-A385D49B39ED}" type="datetimeFigureOut">
               <a:rPr lang="en-US" smtClean="0"/>
-              <a:t>4/18/20</a:t>
+              <a:t>4/19/20</a:t>
             </a:fld>
             <a:endParaRPr lang="en-US"/>
           </a:p>
@@ -1724,7 +1724,7 @@
           <a:p>
             <a:fld id="{577C0138-7A75-8149-9F79-A385D49B39ED}" type="datetimeFigureOut">
               <a:rPr lang="en-US" smtClean="0"/>
-              <a:t>4/18/20</a:t>
+              <a:t>4/19/20</a:t>
             </a:fld>
             <a:endParaRPr lang="en-US"/>
           </a:p>
@@ -1819,7 +1819,7 @@
           <a:p>
             <a:fld id="{577C0138-7A75-8149-9F79-A385D49B39ED}" type="datetimeFigureOut">
               <a:rPr lang="en-US" smtClean="0"/>
-              <a:t>4/18/20</a:t>
+              <a:t>4/19/20</a:t>
             </a:fld>
             <a:endParaRPr lang="en-US"/>
           </a:p>
@@ -2096,7 +2096,7 @@
           <a:p>
             <a:fld id="{577C0138-7A75-8149-9F79-A385D49B39ED}" type="datetimeFigureOut">
               <a:rPr lang="en-US" smtClean="0"/>
-              <a:t>4/18/20</a:t>
+              <a:t>4/19/20</a:t>
             </a:fld>
             <a:endParaRPr lang="en-US"/>
           </a:p>
@@ -2353,7 +2353,7 @@
           <a:p>
             <a:fld id="{577C0138-7A75-8149-9F79-A385D49B39ED}" type="datetimeFigureOut">
               <a:rPr lang="en-US" smtClean="0"/>
-              <a:t>4/18/20</a:t>
+              <a:t>4/19/20</a:t>
             </a:fld>
             <a:endParaRPr lang="en-US"/>
           </a:p>
@@ -2566,7 +2566,7 @@
           <a:p>
             <a:fld id="{577C0138-7A75-8149-9F79-A385D49B39ED}" type="datetimeFigureOut">
               <a:rPr lang="en-US" smtClean="0"/>
-              <a:t>4/18/20</a:t>
+              <a:t>4/19/20</a:t>
             </a:fld>
             <a:endParaRPr lang="en-US"/>
           </a:p>
@@ -2973,10 +2973,10 @@
       </p:grpSpPr>
       <p:pic>
         <p:nvPicPr>
-          <p:cNvPr id="14" name="Picture 13">
+          <p:cNvPr id="12" name="Picture 11">
             <a:extLst>
               <a:ext uri="{FF2B5EF4-FFF2-40B4-BE49-F238E27FC236}">
-                <a16:creationId xmlns:a16="http://schemas.microsoft.com/office/drawing/2014/main" id="{7DCB1191-D680-E844-89B2-69F898388212}"/>
+                <a16:creationId xmlns:a16="http://schemas.microsoft.com/office/drawing/2014/main" id="{DC6CFD81-539B-E741-9059-8FCEBDD8B4AF}"/>
               </a:ext>
             </a:extLst>
           </p:cNvPr>
@@ -2993,7 +2993,127 @@
         </p:blipFill>
         <p:spPr>
           <a:xfrm>
-            <a:off x="17580357" y="17097340"/>
+            <a:off x="13370365" y="9820329"/>
+            <a:ext cx="15150208" cy="7564298"/>
+          </a:xfrm>
+          <a:prstGeom prst="rect">
+            <a:avLst/>
+          </a:prstGeom>
+        </p:spPr>
+      </p:pic>
+      <p:pic>
+        <p:nvPicPr>
+          <p:cNvPr id="8" name="Picture 7">
+            <a:extLst>
+              <a:ext uri="{FF2B5EF4-FFF2-40B4-BE49-F238E27FC236}">
+                <a16:creationId xmlns:a16="http://schemas.microsoft.com/office/drawing/2014/main" id="{D0C34F89-2E7F-6143-B004-36843B073BEC}"/>
+              </a:ext>
+            </a:extLst>
+          </p:cNvPr>
+          <p:cNvPicPr>
+            <a:picLocks noChangeAspect="1"/>
+          </p:cNvPicPr>
+          <p:nvPr/>
+        </p:nvPicPr>
+        <p:blipFill>
+          <a:blip r:embed="rId3"/>
+          <a:stretch>
+            <a:fillRect/>
+          </a:stretch>
+        </p:blipFill>
+        <p:spPr>
+          <a:xfrm>
+            <a:off x="-181354" y="9794298"/>
+            <a:ext cx="13853474" cy="7564299"/>
+          </a:xfrm>
+          <a:prstGeom prst="rect">
+            <a:avLst/>
+          </a:prstGeom>
+        </p:spPr>
+      </p:pic>
+      <p:pic>
+        <p:nvPicPr>
+          <p:cNvPr id="6" name="Picture 5">
+            <a:extLst>
+              <a:ext uri="{FF2B5EF4-FFF2-40B4-BE49-F238E27FC236}">
+                <a16:creationId xmlns:a16="http://schemas.microsoft.com/office/drawing/2014/main" id="{D84BBCD3-21F5-EC47-AB86-14F34BCBC86D}"/>
+              </a:ext>
+            </a:extLst>
+          </p:cNvPr>
+          <p:cNvPicPr>
+            <a:picLocks noChangeAspect="1"/>
+          </p:cNvPicPr>
+          <p:nvPr/>
+        </p:nvPicPr>
+        <p:blipFill>
+          <a:blip r:embed="rId4"/>
+          <a:stretch>
+            <a:fillRect/>
+          </a:stretch>
+        </p:blipFill>
+        <p:spPr>
+          <a:xfrm>
+            <a:off x="12967695" y="775856"/>
+            <a:ext cx="15673366" cy="8888187"/>
+          </a:xfrm>
+          <a:prstGeom prst="rect">
+            <a:avLst/>
+          </a:prstGeom>
+        </p:spPr>
+      </p:pic>
+      <p:pic>
+        <p:nvPicPr>
+          <p:cNvPr id="4" name="Picture 3">
+            <a:extLst>
+              <a:ext uri="{FF2B5EF4-FFF2-40B4-BE49-F238E27FC236}">
+                <a16:creationId xmlns:a16="http://schemas.microsoft.com/office/drawing/2014/main" id="{35726FAD-8D2F-4441-8CF6-A4FF21D34DD7}"/>
+              </a:ext>
+            </a:extLst>
+          </p:cNvPr>
+          <p:cNvPicPr>
+            <a:picLocks noChangeAspect="1"/>
+          </p:cNvPicPr>
+          <p:nvPr/>
+        </p:nvPicPr>
+        <p:blipFill>
+          <a:blip r:embed="rId5"/>
+          <a:stretch>
+            <a:fillRect/>
+          </a:stretch>
+        </p:blipFill>
+        <p:spPr>
+          <a:xfrm>
+            <a:off x="408179" y="645228"/>
+            <a:ext cx="12850895" cy="8888187"/>
+          </a:xfrm>
+          <a:prstGeom prst="rect">
+            <a:avLst/>
+          </a:prstGeom>
+        </p:spPr>
+      </p:pic>
+      <p:pic>
+        <p:nvPicPr>
+          <p:cNvPr id="14" name="Picture 13">
+            <a:extLst>
+              <a:ext uri="{FF2B5EF4-FFF2-40B4-BE49-F238E27FC236}">
+                <a16:creationId xmlns:a16="http://schemas.microsoft.com/office/drawing/2014/main" id="{7DCB1191-D680-E844-89B2-69F898388212}"/>
+              </a:ext>
+            </a:extLst>
+          </p:cNvPr>
+          <p:cNvPicPr>
+            <a:picLocks noChangeAspect="1"/>
+          </p:cNvPicPr>
+          <p:nvPr/>
+        </p:nvPicPr>
+        <p:blipFill>
+          <a:blip r:embed="rId6"/>
+          <a:stretch>
+            <a:fillRect/>
+          </a:stretch>
+        </p:blipFill>
+        <p:spPr>
+          <a:xfrm>
+            <a:off x="17580357" y="17576313"/>
             <a:ext cx="8517123" cy="6562374"/>
           </a:xfrm>
           <a:prstGeom prst="rect">
@@ -3016,126 +3136,6 @@
           <p:nvPr/>
         </p:nvPicPr>
         <p:blipFill>
-          <a:blip r:embed="rId3"/>
-          <a:stretch>
-            <a:fillRect/>
-          </a:stretch>
-        </p:blipFill>
-        <p:spPr>
-          <a:xfrm>
-            <a:off x="1831890" y="17097340"/>
-            <a:ext cx="10846263" cy="6420332"/>
-          </a:xfrm>
-          <a:prstGeom prst="rect">
-            <a:avLst/>
-          </a:prstGeom>
-        </p:spPr>
-      </p:pic>
-      <p:pic>
-        <p:nvPicPr>
-          <p:cNvPr id="3" name="Picture 2">
-            <a:extLst>
-              <a:ext uri="{FF2B5EF4-FFF2-40B4-BE49-F238E27FC236}">
-                <a16:creationId xmlns:a16="http://schemas.microsoft.com/office/drawing/2014/main" id="{175F16CF-2116-204A-B13D-C5FBEF5E78CB}"/>
-              </a:ext>
-            </a:extLst>
-          </p:cNvPr>
-          <p:cNvPicPr>
-            <a:picLocks noChangeAspect="1"/>
-          </p:cNvPicPr>
-          <p:nvPr/>
-        </p:nvPicPr>
-        <p:blipFill>
-          <a:blip r:embed="rId4"/>
-          <a:stretch>
-            <a:fillRect/>
-          </a:stretch>
-        </p:blipFill>
-        <p:spPr>
-          <a:xfrm>
-            <a:off x="756362" y="774768"/>
-            <a:ext cx="12234858" cy="8437372"/>
-          </a:xfrm>
-          <a:prstGeom prst="rect">
-            <a:avLst/>
-          </a:prstGeom>
-        </p:spPr>
-      </p:pic>
-      <p:pic>
-        <p:nvPicPr>
-          <p:cNvPr id="19" name="Picture 18">
-            <a:extLst>
-              <a:ext uri="{FF2B5EF4-FFF2-40B4-BE49-F238E27FC236}">
-                <a16:creationId xmlns:a16="http://schemas.microsoft.com/office/drawing/2014/main" id="{3539D3FF-FD68-DC4E-9F69-1EE657A201C3}"/>
-              </a:ext>
-            </a:extLst>
-          </p:cNvPr>
-          <p:cNvPicPr>
-            <a:picLocks noChangeAspect="1"/>
-          </p:cNvPicPr>
-          <p:nvPr/>
-        </p:nvPicPr>
-        <p:blipFill>
-          <a:blip r:embed="rId5"/>
-          <a:stretch>
-            <a:fillRect/>
-          </a:stretch>
-        </p:blipFill>
-        <p:spPr>
-          <a:xfrm>
-            <a:off x="-140427" y="9594182"/>
-            <a:ext cx="13806244" cy="7503158"/>
-          </a:xfrm>
-          <a:prstGeom prst="rect">
-            <a:avLst/>
-          </a:prstGeom>
-        </p:spPr>
-      </p:pic>
-      <p:pic>
-        <p:nvPicPr>
-          <p:cNvPr id="21" name="Picture 20">
-            <a:extLst>
-              <a:ext uri="{FF2B5EF4-FFF2-40B4-BE49-F238E27FC236}">
-                <a16:creationId xmlns:a16="http://schemas.microsoft.com/office/drawing/2014/main" id="{E77D0C78-D684-B841-968A-56EA493EECC2}"/>
-              </a:ext>
-            </a:extLst>
-          </p:cNvPr>
-          <p:cNvPicPr>
-            <a:picLocks noChangeAspect="1"/>
-          </p:cNvPicPr>
-          <p:nvPr/>
-        </p:nvPicPr>
-        <p:blipFill>
-          <a:blip r:embed="rId6"/>
-          <a:stretch>
-            <a:fillRect/>
-          </a:stretch>
-        </p:blipFill>
-        <p:spPr>
-          <a:xfrm>
-            <a:off x="13672120" y="9594182"/>
-            <a:ext cx="14893736" cy="7398893"/>
-          </a:xfrm>
-          <a:prstGeom prst="rect">
-            <a:avLst/>
-          </a:prstGeom>
-        </p:spPr>
-      </p:pic>
-      <p:pic>
-        <p:nvPicPr>
-          <p:cNvPr id="23" name="Picture 22">
-            <a:extLst>
-              <a:ext uri="{FF2B5EF4-FFF2-40B4-BE49-F238E27FC236}">
-                <a16:creationId xmlns:a16="http://schemas.microsoft.com/office/drawing/2014/main" id="{F34F3224-A425-FE4E-82D8-0DABDA0F80D8}"/>
-              </a:ext>
-            </a:extLst>
-          </p:cNvPr>
-          <p:cNvPicPr>
-            <a:picLocks noChangeAspect="1"/>
-          </p:cNvPicPr>
-          <p:nvPr/>
-        </p:nvPicPr>
-        <p:blipFill>
           <a:blip r:embed="rId7"/>
           <a:stretch>
             <a:fillRect/>
@@ -3143,8 +3143,8 @@
         </p:blipFill>
         <p:spPr>
           <a:xfrm>
-            <a:off x="13302617" y="919522"/>
-            <a:ext cx="14087892" cy="8292618"/>
+            <a:off x="1831890" y="17576313"/>
+            <a:ext cx="10846263" cy="6420332"/>
           </a:xfrm>
           <a:prstGeom prst="rect">
             <a:avLst/>
@@ -3200,7 +3200,7 @@
         </p:nvSpPr>
         <p:spPr>
           <a:xfrm>
-            <a:off x="17281877" y="17523249"/>
+            <a:off x="17281877" y="18002222"/>
             <a:ext cx="298480" cy="523220"/>
           </a:xfrm>
           <a:prstGeom prst="rect">
@@ -3235,7 +3235,7 @@
         </p:nvSpPr>
         <p:spPr>
           <a:xfrm>
-            <a:off x="3529481" y="17523249"/>
+            <a:off x="3529481" y="18002222"/>
             <a:ext cx="343570" cy="519588"/>
           </a:xfrm>
           <a:prstGeom prst="rect">
@@ -3270,7 +3270,7 @@
         </p:nvSpPr>
         <p:spPr>
           <a:xfrm>
-            <a:off x="16325269" y="9574138"/>
+            <a:off x="16325269" y="9704767"/>
             <a:ext cx="377026" cy="523220"/>
           </a:xfrm>
           <a:prstGeom prst="rect">
@@ -3305,7 +3305,7 @@
         </p:nvSpPr>
         <p:spPr>
           <a:xfrm>
-            <a:off x="1298345" y="9594182"/>
+            <a:off x="1298345" y="9724811"/>
             <a:ext cx="284258" cy="523220"/>
           </a:xfrm>
           <a:prstGeom prst="rect">

</xml_diff>

<commit_message>
update color palette and categories
</commit_message>
<xml_diff>
--- a/figures/multipanel.pptx
+++ b/figures/multipanel.pptx
@@ -8,6 +8,7 @@
     <p:sldId id="256" r:id="rId2"/>
     <p:sldId id="257" r:id="rId3"/>
     <p:sldId id="258" r:id="rId4"/>
+    <p:sldId id="259" r:id="rId5"/>
   </p:sldIdLst>
   <p:sldSz cx="28346400" cy="28346400"/>
   <p:notesSz cx="6858000" cy="9144000"/>
@@ -245,7 +246,7 @@
           <a:p>
             <a:fld id="{577C0138-7A75-8149-9F79-A385D49B39ED}" type="datetimeFigureOut">
               <a:rPr lang="en-US" smtClean="0"/>
-              <a:t>4/29/20</a:t>
+              <a:t>6/17/20</a:t>
             </a:fld>
             <a:endParaRPr lang="en-US"/>
           </a:p>
@@ -415,7 +416,7 @@
           <a:p>
             <a:fld id="{577C0138-7A75-8149-9F79-A385D49B39ED}" type="datetimeFigureOut">
               <a:rPr lang="en-US" smtClean="0"/>
-              <a:t>4/29/20</a:t>
+              <a:t>6/17/20</a:t>
             </a:fld>
             <a:endParaRPr lang="en-US"/>
           </a:p>
@@ -595,7 +596,7 @@
           <a:p>
             <a:fld id="{577C0138-7A75-8149-9F79-A385D49B39ED}" type="datetimeFigureOut">
               <a:rPr lang="en-US" smtClean="0"/>
-              <a:t>4/29/20</a:t>
+              <a:t>6/17/20</a:t>
             </a:fld>
             <a:endParaRPr lang="en-US"/>
           </a:p>
@@ -765,7 +766,7 @@
           <a:p>
             <a:fld id="{577C0138-7A75-8149-9F79-A385D49B39ED}" type="datetimeFigureOut">
               <a:rPr lang="en-US" smtClean="0"/>
-              <a:t>4/29/20</a:t>
+              <a:t>6/17/20</a:t>
             </a:fld>
             <a:endParaRPr lang="en-US"/>
           </a:p>
@@ -1009,7 +1010,7 @@
           <a:p>
             <a:fld id="{577C0138-7A75-8149-9F79-A385D49B39ED}" type="datetimeFigureOut">
               <a:rPr lang="en-US" smtClean="0"/>
-              <a:t>4/29/20</a:t>
+              <a:t>6/17/20</a:t>
             </a:fld>
             <a:endParaRPr lang="en-US"/>
           </a:p>
@@ -1241,7 +1242,7 @@
           <a:p>
             <a:fld id="{577C0138-7A75-8149-9F79-A385D49B39ED}" type="datetimeFigureOut">
               <a:rPr lang="en-US" smtClean="0"/>
-              <a:t>4/29/20</a:t>
+              <a:t>6/17/20</a:t>
             </a:fld>
             <a:endParaRPr lang="en-US"/>
           </a:p>
@@ -1608,7 +1609,7 @@
           <a:p>
             <a:fld id="{577C0138-7A75-8149-9F79-A385D49B39ED}" type="datetimeFigureOut">
               <a:rPr lang="en-US" smtClean="0"/>
-              <a:t>4/29/20</a:t>
+              <a:t>6/17/20</a:t>
             </a:fld>
             <a:endParaRPr lang="en-US"/>
           </a:p>
@@ -1726,7 +1727,7 @@
           <a:p>
             <a:fld id="{577C0138-7A75-8149-9F79-A385D49B39ED}" type="datetimeFigureOut">
               <a:rPr lang="en-US" smtClean="0"/>
-              <a:t>4/29/20</a:t>
+              <a:t>6/17/20</a:t>
             </a:fld>
             <a:endParaRPr lang="en-US"/>
           </a:p>
@@ -1821,7 +1822,7 @@
           <a:p>
             <a:fld id="{577C0138-7A75-8149-9F79-A385D49B39ED}" type="datetimeFigureOut">
               <a:rPr lang="en-US" smtClean="0"/>
-              <a:t>4/29/20</a:t>
+              <a:t>6/17/20</a:t>
             </a:fld>
             <a:endParaRPr lang="en-US"/>
           </a:p>
@@ -2098,7 +2099,7 @@
           <a:p>
             <a:fld id="{577C0138-7A75-8149-9F79-A385D49B39ED}" type="datetimeFigureOut">
               <a:rPr lang="en-US" smtClean="0"/>
-              <a:t>4/29/20</a:t>
+              <a:t>6/17/20</a:t>
             </a:fld>
             <a:endParaRPr lang="en-US"/>
           </a:p>
@@ -2355,7 +2356,7 @@
           <a:p>
             <a:fld id="{577C0138-7A75-8149-9F79-A385D49B39ED}" type="datetimeFigureOut">
               <a:rPr lang="en-US" smtClean="0"/>
-              <a:t>4/29/20</a:t>
+              <a:t>6/17/20</a:t>
             </a:fld>
             <a:endParaRPr lang="en-US"/>
           </a:p>
@@ -2568,7 +2569,7 @@
           <a:p>
             <a:fld id="{577C0138-7A75-8149-9F79-A385D49B39ED}" type="datetimeFigureOut">
               <a:rPr lang="en-US" smtClean="0"/>
-              <a:t>4/29/20</a:t>
+              <a:t>6/17/20</a:t>
             </a:fld>
             <a:endParaRPr lang="en-US"/>
           </a:p>
@@ -6257,6 +6258,1340 @@
 </p:sld>
 </file>
 
+<file path=ppt/slides/slide4.xml><?xml version="1.0" encoding="utf-8"?>
+<p:sld xmlns:a="http://schemas.openxmlformats.org/drawingml/2006/main" xmlns:r="http://schemas.openxmlformats.org/officeDocument/2006/relationships" xmlns:p="http://schemas.openxmlformats.org/presentationml/2006/main">
+  <p:cSld>
+    <p:spTree>
+      <p:nvGrpSpPr>
+        <p:cNvPr id="1" name=""/>
+        <p:cNvGrpSpPr/>
+        <p:nvPr/>
+      </p:nvGrpSpPr>
+      <p:grpSpPr>
+        <a:xfrm>
+          <a:off x="0" y="0"/>
+          <a:ext cx="0" cy="0"/>
+          <a:chOff x="0" y="0"/>
+          <a:chExt cx="0" cy="0"/>
+        </a:xfrm>
+      </p:grpSpPr>
+      <p:pic>
+        <p:nvPicPr>
+          <p:cNvPr id="45" name="Picture 44">
+            <a:extLst>
+              <a:ext uri="{FF2B5EF4-FFF2-40B4-BE49-F238E27FC236}">
+                <a16:creationId xmlns:a16="http://schemas.microsoft.com/office/drawing/2014/main" id="{2B54D000-3447-7444-A2DF-8448823BE89C}"/>
+              </a:ext>
+            </a:extLst>
+          </p:cNvPr>
+          <p:cNvPicPr>
+            <a:picLocks noChangeAspect="1"/>
+          </p:cNvPicPr>
+          <p:nvPr/>
+        </p:nvPicPr>
+        <p:blipFill>
+          <a:blip r:embed="rId2"/>
+          <a:stretch>
+            <a:fillRect/>
+          </a:stretch>
+        </p:blipFill>
+        <p:spPr>
+          <a:xfrm>
+            <a:off x="7658" y="17145671"/>
+            <a:ext cx="15963900" cy="11391900"/>
+          </a:xfrm>
+          <a:prstGeom prst="rect">
+            <a:avLst/>
+          </a:prstGeom>
+        </p:spPr>
+      </p:pic>
+      <p:pic>
+        <p:nvPicPr>
+          <p:cNvPr id="3" name="Picture 2">
+            <a:extLst>
+              <a:ext uri="{FF2B5EF4-FFF2-40B4-BE49-F238E27FC236}">
+                <a16:creationId xmlns:a16="http://schemas.microsoft.com/office/drawing/2014/main" id="{6D7C9C0D-F924-0344-805C-19DB38D9CE79}"/>
+              </a:ext>
+            </a:extLst>
+          </p:cNvPr>
+          <p:cNvPicPr>
+            <a:picLocks noChangeAspect="1"/>
+          </p:cNvPicPr>
+          <p:nvPr/>
+        </p:nvPicPr>
+        <p:blipFill>
+          <a:blip r:embed="rId3"/>
+          <a:stretch>
+            <a:fillRect/>
+          </a:stretch>
+        </p:blipFill>
+        <p:spPr>
+          <a:xfrm>
+            <a:off x="568876" y="351513"/>
+            <a:ext cx="12862268" cy="8896053"/>
+          </a:xfrm>
+          <a:prstGeom prst="rect">
+            <a:avLst/>
+          </a:prstGeom>
+        </p:spPr>
+      </p:pic>
+      <p:pic>
+        <p:nvPicPr>
+          <p:cNvPr id="9" name="Picture 8">
+            <a:extLst>
+              <a:ext uri="{FF2B5EF4-FFF2-40B4-BE49-F238E27FC236}">
+                <a16:creationId xmlns:a16="http://schemas.microsoft.com/office/drawing/2014/main" id="{073D9AE4-A0B5-CB44-A457-00B768BF0767}"/>
+              </a:ext>
+            </a:extLst>
+          </p:cNvPr>
+          <p:cNvPicPr>
+            <a:picLocks noChangeAspect="1"/>
+          </p:cNvPicPr>
+          <p:nvPr/>
+        </p:nvPicPr>
+        <p:blipFill>
+          <a:blip r:embed="rId4"/>
+          <a:stretch>
+            <a:fillRect/>
+          </a:stretch>
+        </p:blipFill>
+        <p:spPr>
+          <a:xfrm>
+            <a:off x="13920322" y="624019"/>
+            <a:ext cx="14482983" cy="8888187"/>
+          </a:xfrm>
+          <a:prstGeom prst="rect">
+            <a:avLst/>
+          </a:prstGeom>
+        </p:spPr>
+      </p:pic>
+      <p:pic>
+        <p:nvPicPr>
+          <p:cNvPr id="12" name="Picture 11">
+            <a:extLst>
+              <a:ext uri="{FF2B5EF4-FFF2-40B4-BE49-F238E27FC236}">
+                <a16:creationId xmlns:a16="http://schemas.microsoft.com/office/drawing/2014/main" id="{0CDC93B2-18E1-864C-8FA6-285BB02248CB}"/>
+              </a:ext>
+            </a:extLst>
+          </p:cNvPr>
+          <p:cNvPicPr>
+            <a:picLocks noChangeAspect="1"/>
+          </p:cNvPicPr>
+          <p:nvPr/>
+        </p:nvPicPr>
+        <p:blipFill>
+          <a:blip r:embed="rId5"/>
+          <a:stretch>
+            <a:fillRect/>
+          </a:stretch>
+        </p:blipFill>
+        <p:spPr>
+          <a:xfrm>
+            <a:off x="-50800" y="9291358"/>
+            <a:ext cx="14006934" cy="8239373"/>
+          </a:xfrm>
+          <a:prstGeom prst="rect">
+            <a:avLst/>
+          </a:prstGeom>
+        </p:spPr>
+      </p:pic>
+      <p:pic>
+        <p:nvPicPr>
+          <p:cNvPr id="15" name="Picture 14">
+            <a:extLst>
+              <a:ext uri="{FF2B5EF4-FFF2-40B4-BE49-F238E27FC236}">
+                <a16:creationId xmlns:a16="http://schemas.microsoft.com/office/drawing/2014/main" id="{D670591C-81D3-AC4E-8526-2A0217A3C010}"/>
+              </a:ext>
+            </a:extLst>
+          </p:cNvPr>
+          <p:cNvPicPr>
+            <a:picLocks noChangeAspect="1"/>
+          </p:cNvPicPr>
+          <p:nvPr/>
+        </p:nvPicPr>
+        <p:blipFill>
+          <a:blip r:embed="rId6"/>
+          <a:stretch>
+            <a:fillRect/>
+          </a:stretch>
+        </p:blipFill>
+        <p:spPr>
+          <a:xfrm>
+            <a:off x="13512034" y="9305931"/>
+            <a:ext cx="15128024" cy="8073880"/>
+          </a:xfrm>
+          <a:prstGeom prst="rect">
+            <a:avLst/>
+          </a:prstGeom>
+        </p:spPr>
+      </p:pic>
+      <p:sp>
+        <p:nvSpPr>
+          <p:cNvPr id="24" name="TextBox 23">
+            <a:extLst>
+              <a:ext uri="{FF2B5EF4-FFF2-40B4-BE49-F238E27FC236}">
+                <a16:creationId xmlns:a16="http://schemas.microsoft.com/office/drawing/2014/main" id="{E116B10B-E50B-334D-BC32-4A81C34527AE}"/>
+              </a:ext>
+            </a:extLst>
+          </p:cNvPr>
+          <p:cNvSpPr txBox="1"/>
+          <p:nvPr/>
+        </p:nvSpPr>
+        <p:spPr>
+          <a:xfrm>
+            <a:off x="1298358" y="260974"/>
+            <a:ext cx="340205" cy="519588"/>
+          </a:xfrm>
+          <a:prstGeom prst="rect">
+            <a:avLst/>
+          </a:prstGeom>
+          <a:noFill/>
+        </p:spPr>
+        <p:txBody>
+          <a:bodyPr wrap="square" rtlCol="0">
+            <a:spAutoFit/>
+          </a:bodyPr>
+          <a:lstStyle/>
+          <a:p>
+            <a:r>
+              <a:rPr lang="en-US" sz="2800" b="1" dirty="0"/>
+              <a:t>a</a:t>
+            </a:r>
+          </a:p>
+        </p:txBody>
+      </p:sp>
+      <p:sp>
+        <p:nvSpPr>
+          <p:cNvPr id="25" name="TextBox 24">
+            <a:extLst>
+              <a:ext uri="{FF2B5EF4-FFF2-40B4-BE49-F238E27FC236}">
+                <a16:creationId xmlns:a16="http://schemas.microsoft.com/office/drawing/2014/main" id="{5095E299-B4BC-B649-941A-77FB5AB3D5F8}"/>
+              </a:ext>
+            </a:extLst>
+          </p:cNvPr>
+          <p:cNvSpPr txBox="1"/>
+          <p:nvPr/>
+        </p:nvSpPr>
+        <p:spPr>
+          <a:xfrm>
+            <a:off x="17986982" y="17306421"/>
+            <a:ext cx="298480" cy="523220"/>
+          </a:xfrm>
+          <a:prstGeom prst="rect">
+            <a:avLst/>
+          </a:prstGeom>
+          <a:noFill/>
+        </p:spPr>
+        <p:txBody>
+          <a:bodyPr wrap="none" rtlCol="0">
+            <a:spAutoFit/>
+          </a:bodyPr>
+          <a:lstStyle/>
+          <a:p>
+            <a:r>
+              <a:rPr lang="en-US" sz="2800" b="1" dirty="0"/>
+              <a:t>f</a:t>
+            </a:r>
+          </a:p>
+        </p:txBody>
+      </p:sp>
+      <p:sp>
+        <p:nvSpPr>
+          <p:cNvPr id="26" name="TextBox 25">
+            <a:extLst>
+              <a:ext uri="{FF2B5EF4-FFF2-40B4-BE49-F238E27FC236}">
+                <a16:creationId xmlns:a16="http://schemas.microsoft.com/office/drawing/2014/main" id="{B29B5468-E719-5241-BBD8-8952B0AFC639}"/>
+              </a:ext>
+            </a:extLst>
+          </p:cNvPr>
+          <p:cNvSpPr txBox="1"/>
+          <p:nvPr/>
+        </p:nvSpPr>
+        <p:spPr>
+          <a:xfrm>
+            <a:off x="1228160" y="17009881"/>
+            <a:ext cx="343570" cy="519588"/>
+          </a:xfrm>
+          <a:prstGeom prst="rect">
+            <a:avLst/>
+          </a:prstGeom>
+          <a:noFill/>
+        </p:spPr>
+        <p:txBody>
+          <a:bodyPr wrap="square" rtlCol="0">
+            <a:spAutoFit/>
+          </a:bodyPr>
+          <a:lstStyle/>
+          <a:p>
+            <a:r>
+              <a:rPr lang="en-US" sz="2800" b="1" dirty="0"/>
+              <a:t>e</a:t>
+            </a:r>
+          </a:p>
+        </p:txBody>
+      </p:sp>
+      <p:sp>
+        <p:nvSpPr>
+          <p:cNvPr id="27" name="TextBox 26">
+            <a:extLst>
+              <a:ext uri="{FF2B5EF4-FFF2-40B4-BE49-F238E27FC236}">
+                <a16:creationId xmlns:a16="http://schemas.microsoft.com/office/drawing/2014/main" id="{43475BF6-D5F4-344F-9235-D248DE675CFD}"/>
+              </a:ext>
+            </a:extLst>
+          </p:cNvPr>
+          <p:cNvSpPr txBox="1"/>
+          <p:nvPr/>
+        </p:nvSpPr>
+        <p:spPr>
+          <a:xfrm>
+            <a:off x="16325269" y="9501567"/>
+            <a:ext cx="377026" cy="523220"/>
+          </a:xfrm>
+          <a:prstGeom prst="rect">
+            <a:avLst/>
+          </a:prstGeom>
+          <a:noFill/>
+        </p:spPr>
+        <p:txBody>
+          <a:bodyPr wrap="none" rtlCol="0">
+            <a:spAutoFit/>
+          </a:bodyPr>
+          <a:lstStyle/>
+          <a:p>
+            <a:r>
+              <a:rPr lang="en-US" sz="2800" b="1" dirty="0"/>
+              <a:t>d</a:t>
+            </a:r>
+          </a:p>
+        </p:txBody>
+      </p:sp>
+      <p:sp>
+        <p:nvSpPr>
+          <p:cNvPr id="28" name="TextBox 27">
+            <a:extLst>
+              <a:ext uri="{FF2B5EF4-FFF2-40B4-BE49-F238E27FC236}">
+                <a16:creationId xmlns:a16="http://schemas.microsoft.com/office/drawing/2014/main" id="{509B97EE-1662-F54A-A8E5-08ABDDF40339}"/>
+              </a:ext>
+            </a:extLst>
+          </p:cNvPr>
+          <p:cNvSpPr txBox="1"/>
+          <p:nvPr/>
+        </p:nvSpPr>
+        <p:spPr>
+          <a:xfrm>
+            <a:off x="1298345" y="9521611"/>
+            <a:ext cx="284258" cy="523220"/>
+          </a:xfrm>
+          <a:prstGeom prst="rect">
+            <a:avLst/>
+          </a:prstGeom>
+          <a:noFill/>
+        </p:spPr>
+        <p:txBody>
+          <a:bodyPr wrap="square" rtlCol="0">
+            <a:spAutoFit/>
+          </a:bodyPr>
+          <a:lstStyle/>
+          <a:p>
+            <a:r>
+              <a:rPr lang="en-US" sz="2800" b="1" dirty="0"/>
+              <a:t>c</a:t>
+            </a:r>
+          </a:p>
+        </p:txBody>
+      </p:sp>
+      <p:sp>
+        <p:nvSpPr>
+          <p:cNvPr id="29" name="TextBox 28">
+            <a:extLst>
+              <a:ext uri="{FF2B5EF4-FFF2-40B4-BE49-F238E27FC236}">
+                <a16:creationId xmlns:a16="http://schemas.microsoft.com/office/drawing/2014/main" id="{1176DB54-2E10-AA42-8C3C-FFD1FE6CC505}"/>
+              </a:ext>
+            </a:extLst>
+          </p:cNvPr>
+          <p:cNvSpPr txBox="1"/>
+          <p:nvPr/>
+        </p:nvSpPr>
+        <p:spPr>
+          <a:xfrm>
+            <a:off x="16136756" y="260974"/>
+            <a:ext cx="377026" cy="523220"/>
+          </a:xfrm>
+          <a:prstGeom prst="rect">
+            <a:avLst/>
+          </a:prstGeom>
+          <a:noFill/>
+        </p:spPr>
+        <p:txBody>
+          <a:bodyPr wrap="none" rtlCol="0">
+            <a:spAutoFit/>
+          </a:bodyPr>
+          <a:lstStyle/>
+          <a:p>
+            <a:r>
+              <a:rPr lang="en-US" sz="2800" b="1" dirty="0"/>
+              <a:t>b</a:t>
+            </a:r>
+          </a:p>
+        </p:txBody>
+      </p:sp>
+      <p:sp>
+        <p:nvSpPr>
+          <p:cNvPr id="16" name="TextBox 15">
+            <a:extLst>
+              <a:ext uri="{FF2B5EF4-FFF2-40B4-BE49-F238E27FC236}">
+                <a16:creationId xmlns:a16="http://schemas.microsoft.com/office/drawing/2014/main" id="{8CA66D28-72ED-4645-8B3D-01FA49C3AF54}"/>
+              </a:ext>
+            </a:extLst>
+          </p:cNvPr>
+          <p:cNvSpPr txBox="1"/>
+          <p:nvPr/>
+        </p:nvSpPr>
+        <p:spPr>
+          <a:xfrm>
+            <a:off x="17903682" y="23084970"/>
+            <a:ext cx="286500" cy="523220"/>
+          </a:xfrm>
+          <a:prstGeom prst="rect">
+            <a:avLst/>
+          </a:prstGeom>
+          <a:noFill/>
+        </p:spPr>
+        <p:txBody>
+          <a:bodyPr wrap="square" rtlCol="0">
+            <a:spAutoFit/>
+          </a:bodyPr>
+          <a:lstStyle/>
+          <a:p>
+            <a:r>
+              <a:rPr lang="en-US" sz="2800" b="1" dirty="0"/>
+              <a:t>g</a:t>
+            </a:r>
+          </a:p>
+        </p:txBody>
+      </p:sp>
+      <p:pic>
+        <p:nvPicPr>
+          <p:cNvPr id="51" name="Picture 50">
+            <a:extLst>
+              <a:ext uri="{FF2B5EF4-FFF2-40B4-BE49-F238E27FC236}">
+                <a16:creationId xmlns:a16="http://schemas.microsoft.com/office/drawing/2014/main" id="{44D018F7-C26B-F045-BFBC-573988CEB05A}"/>
+              </a:ext>
+            </a:extLst>
+          </p:cNvPr>
+          <p:cNvPicPr>
+            <a:picLocks noChangeAspect="1"/>
+          </p:cNvPicPr>
+          <p:nvPr/>
+        </p:nvPicPr>
+        <p:blipFill>
+          <a:blip r:embed="rId7"/>
+          <a:stretch>
+            <a:fillRect/>
+          </a:stretch>
+        </p:blipFill>
+        <p:spPr>
+          <a:xfrm>
+            <a:off x="18504554" y="17379811"/>
+            <a:ext cx="9235254" cy="5684726"/>
+          </a:xfrm>
+          <a:prstGeom prst="rect">
+            <a:avLst/>
+          </a:prstGeom>
+        </p:spPr>
+      </p:pic>
+      <p:pic>
+        <p:nvPicPr>
+          <p:cNvPr id="37" name="Picture 36">
+            <a:extLst>
+              <a:ext uri="{FF2B5EF4-FFF2-40B4-BE49-F238E27FC236}">
+                <a16:creationId xmlns:a16="http://schemas.microsoft.com/office/drawing/2014/main" id="{7F675F6E-BDF2-0E42-A0A9-536C7B272F93}"/>
+              </a:ext>
+            </a:extLst>
+          </p:cNvPr>
+          <p:cNvPicPr>
+            <a:picLocks noChangeAspect="1"/>
+          </p:cNvPicPr>
+          <p:nvPr/>
+        </p:nvPicPr>
+        <p:blipFill>
+          <a:blip r:embed="rId8"/>
+          <a:stretch>
+            <a:fillRect/>
+          </a:stretch>
+        </p:blipFill>
+        <p:spPr>
+          <a:xfrm>
+            <a:off x="18514145" y="22841621"/>
+            <a:ext cx="9670437" cy="5295715"/>
+          </a:xfrm>
+          <a:prstGeom prst="rect">
+            <a:avLst/>
+          </a:prstGeom>
+        </p:spPr>
+      </p:pic>
+      <p:cxnSp>
+        <p:nvCxnSpPr>
+          <p:cNvPr id="55" name="Straight Arrow Connector 54">
+            <a:extLst>
+              <a:ext uri="{FF2B5EF4-FFF2-40B4-BE49-F238E27FC236}">
+                <a16:creationId xmlns:a16="http://schemas.microsoft.com/office/drawing/2014/main" id="{7BCDD366-63A0-A541-8F27-97B6C5F0D4EC}"/>
+              </a:ext>
+            </a:extLst>
+          </p:cNvPr>
+          <p:cNvCxnSpPr>
+            <a:cxnSpLocks/>
+          </p:cNvCxnSpPr>
+          <p:nvPr/>
+        </p:nvCxnSpPr>
+        <p:spPr>
+          <a:xfrm flipH="1">
+            <a:off x="12056533" y="17865171"/>
+            <a:ext cx="397950" cy="167672"/>
+          </a:xfrm>
+          <a:prstGeom prst="straightConnector1">
+            <a:avLst/>
+          </a:prstGeom>
+          <a:ln>
+            <a:tailEnd type="triangle"/>
+          </a:ln>
+        </p:spPr>
+        <p:style>
+          <a:lnRef idx="1">
+            <a:schemeClr val="dk1"/>
+          </a:lnRef>
+          <a:fillRef idx="0">
+            <a:schemeClr val="dk1"/>
+          </a:fillRef>
+          <a:effectRef idx="0">
+            <a:schemeClr val="dk1"/>
+          </a:effectRef>
+          <a:fontRef idx="minor">
+            <a:schemeClr val="tx1"/>
+          </a:fontRef>
+        </p:style>
+      </p:cxnSp>
+      <p:sp>
+        <p:nvSpPr>
+          <p:cNvPr id="56" name="TextBox 55">
+            <a:extLst>
+              <a:ext uri="{FF2B5EF4-FFF2-40B4-BE49-F238E27FC236}">
+                <a16:creationId xmlns:a16="http://schemas.microsoft.com/office/drawing/2014/main" id="{79208506-B3E2-3E43-B9FD-5469B8EA00D2}"/>
+              </a:ext>
+            </a:extLst>
+          </p:cNvPr>
+          <p:cNvSpPr txBox="1"/>
+          <p:nvPr/>
+        </p:nvSpPr>
+        <p:spPr>
+          <a:xfrm>
+            <a:off x="12454483" y="17597792"/>
+            <a:ext cx="1034001" cy="477054"/>
+          </a:xfrm>
+          <a:prstGeom prst="rect">
+            <a:avLst/>
+          </a:prstGeom>
+          <a:noFill/>
+        </p:spPr>
+        <p:txBody>
+          <a:bodyPr wrap="none" rtlCol="0">
+            <a:spAutoFit/>
+          </a:bodyPr>
+          <a:lstStyle/>
+          <a:p>
+            <a:r>
+              <a:rPr lang="en-US" sz="2500" dirty="0" err="1"/>
+              <a:t>Ht</a:t>
+            </a:r>
+            <a:r>
+              <a:rPr lang="en-US" sz="2500" dirty="0"/>
+              <a:t>-seq</a:t>
+            </a:r>
+          </a:p>
+        </p:txBody>
+      </p:sp>
+      <p:cxnSp>
+        <p:nvCxnSpPr>
+          <p:cNvPr id="57" name="Straight Arrow Connector 56">
+            <a:extLst>
+              <a:ext uri="{FF2B5EF4-FFF2-40B4-BE49-F238E27FC236}">
+                <a16:creationId xmlns:a16="http://schemas.microsoft.com/office/drawing/2014/main" id="{224873E4-7F05-8C49-94BA-FA6950C75268}"/>
+              </a:ext>
+            </a:extLst>
+          </p:cNvPr>
+          <p:cNvCxnSpPr/>
+          <p:nvPr/>
+        </p:nvCxnSpPr>
+        <p:spPr>
+          <a:xfrm flipH="1">
+            <a:off x="11611759" y="17632372"/>
+            <a:ext cx="372534" cy="300172"/>
+          </a:xfrm>
+          <a:prstGeom prst="straightConnector1">
+            <a:avLst/>
+          </a:prstGeom>
+          <a:ln>
+            <a:tailEnd type="triangle"/>
+          </a:ln>
+        </p:spPr>
+        <p:style>
+          <a:lnRef idx="1">
+            <a:schemeClr val="dk1"/>
+          </a:lnRef>
+          <a:fillRef idx="0">
+            <a:schemeClr val="dk1"/>
+          </a:fillRef>
+          <a:effectRef idx="0">
+            <a:schemeClr val="dk1"/>
+          </a:effectRef>
+          <a:fontRef idx="minor">
+            <a:schemeClr val="tx1"/>
+          </a:fontRef>
+        </p:style>
+      </p:cxnSp>
+      <p:sp>
+        <p:nvSpPr>
+          <p:cNvPr id="58" name="TextBox 57">
+            <a:extLst>
+              <a:ext uri="{FF2B5EF4-FFF2-40B4-BE49-F238E27FC236}">
+                <a16:creationId xmlns:a16="http://schemas.microsoft.com/office/drawing/2014/main" id="{E6A21BDA-A47E-CB47-B7E4-89E8D8F42E6A}"/>
+              </a:ext>
+            </a:extLst>
+          </p:cNvPr>
+          <p:cNvSpPr txBox="1"/>
+          <p:nvPr/>
+        </p:nvSpPr>
+        <p:spPr>
+          <a:xfrm>
+            <a:off x="11816641" y="17320755"/>
+            <a:ext cx="1874744" cy="477054"/>
+          </a:xfrm>
+          <a:prstGeom prst="rect">
+            <a:avLst/>
+          </a:prstGeom>
+          <a:noFill/>
+        </p:spPr>
+        <p:txBody>
+          <a:bodyPr wrap="none" rtlCol="0">
+            <a:spAutoFit/>
+          </a:bodyPr>
+          <a:lstStyle/>
+          <a:p>
+            <a:r>
+              <a:rPr lang="en-US" sz="2500" dirty="0" err="1"/>
+              <a:t>Ht</a:t>
+            </a:r>
+            <a:r>
+              <a:rPr lang="en-US" sz="2500" dirty="0"/>
+              <a:t>-seq-count</a:t>
+            </a:r>
+          </a:p>
+        </p:txBody>
+      </p:sp>
+      <p:sp>
+        <p:nvSpPr>
+          <p:cNvPr id="62" name="TextBox 61">
+            <a:extLst>
+              <a:ext uri="{FF2B5EF4-FFF2-40B4-BE49-F238E27FC236}">
+                <a16:creationId xmlns:a16="http://schemas.microsoft.com/office/drawing/2014/main" id="{E11A9E69-9D85-D54D-8958-3BF7A83E9157}"/>
+              </a:ext>
+            </a:extLst>
+          </p:cNvPr>
+          <p:cNvSpPr txBox="1"/>
+          <p:nvPr/>
+        </p:nvSpPr>
+        <p:spPr>
+          <a:xfrm>
+            <a:off x="15371379" y="18737073"/>
+            <a:ext cx="1173783" cy="477054"/>
+          </a:xfrm>
+          <a:prstGeom prst="rect">
+            <a:avLst/>
+          </a:prstGeom>
+          <a:noFill/>
+        </p:spPr>
+        <p:txBody>
+          <a:bodyPr wrap="none" rtlCol="0">
+            <a:spAutoFit/>
+          </a:bodyPr>
+          <a:lstStyle/>
+          <a:p>
+            <a:r>
+              <a:rPr lang="en-US" sz="2500" dirty="0"/>
+              <a:t>DESeq2</a:t>
+            </a:r>
+          </a:p>
+        </p:txBody>
+      </p:sp>
+      <p:cxnSp>
+        <p:nvCxnSpPr>
+          <p:cNvPr id="64" name="Straight Arrow Connector 63">
+            <a:extLst>
+              <a:ext uri="{FF2B5EF4-FFF2-40B4-BE49-F238E27FC236}">
+                <a16:creationId xmlns:a16="http://schemas.microsoft.com/office/drawing/2014/main" id="{642793B5-3746-C541-A711-3CCFE255BF99}"/>
+              </a:ext>
+            </a:extLst>
+          </p:cNvPr>
+          <p:cNvCxnSpPr/>
+          <p:nvPr/>
+        </p:nvCxnSpPr>
+        <p:spPr>
+          <a:xfrm flipH="1">
+            <a:off x="15104989" y="18976086"/>
+            <a:ext cx="328523" cy="0"/>
+          </a:xfrm>
+          <a:prstGeom prst="straightConnector1">
+            <a:avLst/>
+          </a:prstGeom>
+          <a:ln>
+            <a:tailEnd type="triangle"/>
+          </a:ln>
+        </p:spPr>
+        <p:style>
+          <a:lnRef idx="1">
+            <a:schemeClr val="dk1"/>
+          </a:lnRef>
+          <a:fillRef idx="0">
+            <a:schemeClr val="dk1"/>
+          </a:fillRef>
+          <a:effectRef idx="0">
+            <a:schemeClr val="dk1"/>
+          </a:effectRef>
+          <a:fontRef idx="minor">
+            <a:schemeClr val="tx1"/>
+          </a:fontRef>
+        </p:style>
+      </p:cxnSp>
+      <p:cxnSp>
+        <p:nvCxnSpPr>
+          <p:cNvPr id="65" name="Straight Arrow Connector 64">
+            <a:extLst>
+              <a:ext uri="{FF2B5EF4-FFF2-40B4-BE49-F238E27FC236}">
+                <a16:creationId xmlns:a16="http://schemas.microsoft.com/office/drawing/2014/main" id="{D8CF69DB-C2A1-5B40-8C15-ADF1062047B0}"/>
+              </a:ext>
+            </a:extLst>
+          </p:cNvPr>
+          <p:cNvCxnSpPr/>
+          <p:nvPr/>
+        </p:nvCxnSpPr>
+        <p:spPr>
+          <a:xfrm flipH="1">
+            <a:off x="11281729" y="18571893"/>
+            <a:ext cx="328523" cy="0"/>
+          </a:xfrm>
+          <a:prstGeom prst="straightConnector1">
+            <a:avLst/>
+          </a:prstGeom>
+          <a:ln>
+            <a:tailEnd type="triangle"/>
+          </a:ln>
+        </p:spPr>
+        <p:style>
+          <a:lnRef idx="1">
+            <a:schemeClr val="dk1"/>
+          </a:lnRef>
+          <a:fillRef idx="0">
+            <a:schemeClr val="dk1"/>
+          </a:fillRef>
+          <a:effectRef idx="0">
+            <a:schemeClr val="dk1"/>
+          </a:effectRef>
+          <a:fontRef idx="minor">
+            <a:schemeClr val="tx1"/>
+          </a:fontRef>
+        </p:style>
+      </p:cxnSp>
+      <p:sp>
+        <p:nvSpPr>
+          <p:cNvPr id="66" name="TextBox 65">
+            <a:extLst>
+              <a:ext uri="{FF2B5EF4-FFF2-40B4-BE49-F238E27FC236}">
+                <a16:creationId xmlns:a16="http://schemas.microsoft.com/office/drawing/2014/main" id="{7F277FD2-CA2F-DB41-8CC2-4DD18B503B8E}"/>
+              </a:ext>
+            </a:extLst>
+          </p:cNvPr>
+          <p:cNvSpPr txBox="1"/>
+          <p:nvPr/>
+        </p:nvSpPr>
+        <p:spPr>
+          <a:xfrm>
+            <a:off x="11628859" y="18333366"/>
+            <a:ext cx="1944122" cy="477054"/>
+          </a:xfrm>
+          <a:prstGeom prst="rect">
+            <a:avLst/>
+          </a:prstGeom>
+          <a:noFill/>
+        </p:spPr>
+        <p:txBody>
+          <a:bodyPr wrap="none" rtlCol="0">
+            <a:spAutoFit/>
+          </a:bodyPr>
+          <a:lstStyle/>
+          <a:p>
+            <a:r>
+              <a:rPr lang="en-US" sz="2500" dirty="0" err="1"/>
+              <a:t>Limma</a:t>
+            </a:r>
+            <a:r>
+              <a:rPr lang="en-US" sz="2500" dirty="0"/>
+              <a:t>/</a:t>
+            </a:r>
+            <a:r>
+              <a:rPr lang="en-US" sz="2500" dirty="0" err="1"/>
+              <a:t>Voom</a:t>
+            </a:r>
+            <a:endParaRPr lang="en-US" sz="2500" dirty="0"/>
+          </a:p>
+        </p:txBody>
+      </p:sp>
+      <p:cxnSp>
+        <p:nvCxnSpPr>
+          <p:cNvPr id="67" name="Straight Arrow Connector 66">
+            <a:extLst>
+              <a:ext uri="{FF2B5EF4-FFF2-40B4-BE49-F238E27FC236}">
+                <a16:creationId xmlns:a16="http://schemas.microsoft.com/office/drawing/2014/main" id="{1F9D4944-A884-8A4E-B9C2-A6F103BC3894}"/>
+              </a:ext>
+            </a:extLst>
+          </p:cNvPr>
+          <p:cNvCxnSpPr>
+            <a:cxnSpLocks/>
+          </p:cNvCxnSpPr>
+          <p:nvPr/>
+        </p:nvCxnSpPr>
+        <p:spPr>
+          <a:xfrm flipH="1" flipV="1">
+            <a:off x="11209698" y="18976086"/>
+            <a:ext cx="391025" cy="53009"/>
+          </a:xfrm>
+          <a:prstGeom prst="straightConnector1">
+            <a:avLst/>
+          </a:prstGeom>
+          <a:ln>
+            <a:tailEnd type="triangle"/>
+          </a:ln>
+        </p:spPr>
+        <p:style>
+          <a:lnRef idx="1">
+            <a:schemeClr val="dk1"/>
+          </a:lnRef>
+          <a:fillRef idx="0">
+            <a:schemeClr val="dk1"/>
+          </a:fillRef>
+          <a:effectRef idx="0">
+            <a:schemeClr val="dk1"/>
+          </a:effectRef>
+          <a:fontRef idx="minor">
+            <a:schemeClr val="tx1"/>
+          </a:fontRef>
+        </p:style>
+      </p:cxnSp>
+      <p:sp>
+        <p:nvSpPr>
+          <p:cNvPr id="68" name="TextBox 67">
+            <a:extLst>
+              <a:ext uri="{FF2B5EF4-FFF2-40B4-BE49-F238E27FC236}">
+                <a16:creationId xmlns:a16="http://schemas.microsoft.com/office/drawing/2014/main" id="{DBBF6511-4EB2-5C41-BB27-4F85535C7BBA}"/>
+              </a:ext>
+            </a:extLst>
+          </p:cNvPr>
+          <p:cNvSpPr txBox="1"/>
+          <p:nvPr/>
+        </p:nvSpPr>
+        <p:spPr>
+          <a:xfrm>
+            <a:off x="11596505" y="18790959"/>
+            <a:ext cx="988412" cy="477054"/>
+          </a:xfrm>
+          <a:prstGeom prst="rect">
+            <a:avLst/>
+          </a:prstGeom>
+          <a:noFill/>
+        </p:spPr>
+        <p:txBody>
+          <a:bodyPr wrap="none" rtlCol="0">
+            <a:spAutoFit/>
+          </a:bodyPr>
+          <a:lstStyle/>
+          <a:p>
+            <a:r>
+              <a:rPr lang="en-US" sz="2500" dirty="0" err="1"/>
+              <a:t>EdgeR</a:t>
+            </a:r>
+            <a:endParaRPr lang="en-US" sz="2500" dirty="0"/>
+          </a:p>
+        </p:txBody>
+      </p:sp>
+      <p:cxnSp>
+        <p:nvCxnSpPr>
+          <p:cNvPr id="70" name="Straight Arrow Connector 69">
+            <a:extLst>
+              <a:ext uri="{FF2B5EF4-FFF2-40B4-BE49-F238E27FC236}">
+                <a16:creationId xmlns:a16="http://schemas.microsoft.com/office/drawing/2014/main" id="{202E4145-1FB0-C740-8363-9EE9705C3A1C}"/>
+              </a:ext>
+            </a:extLst>
+          </p:cNvPr>
+          <p:cNvCxnSpPr/>
+          <p:nvPr/>
+        </p:nvCxnSpPr>
+        <p:spPr>
+          <a:xfrm flipH="1">
+            <a:off x="11507015" y="19512802"/>
+            <a:ext cx="328523" cy="0"/>
+          </a:xfrm>
+          <a:prstGeom prst="straightConnector1">
+            <a:avLst/>
+          </a:prstGeom>
+          <a:ln>
+            <a:tailEnd type="triangle"/>
+          </a:ln>
+        </p:spPr>
+        <p:style>
+          <a:lnRef idx="1">
+            <a:schemeClr val="dk1"/>
+          </a:lnRef>
+          <a:fillRef idx="0">
+            <a:schemeClr val="dk1"/>
+          </a:fillRef>
+          <a:effectRef idx="0">
+            <a:schemeClr val="dk1"/>
+          </a:effectRef>
+          <a:fontRef idx="minor">
+            <a:schemeClr val="tx1"/>
+          </a:fontRef>
+        </p:style>
+      </p:cxnSp>
+      <p:sp>
+        <p:nvSpPr>
+          <p:cNvPr id="71" name="TextBox 70">
+            <a:extLst>
+              <a:ext uri="{FF2B5EF4-FFF2-40B4-BE49-F238E27FC236}">
+                <a16:creationId xmlns:a16="http://schemas.microsoft.com/office/drawing/2014/main" id="{370D7EF7-2548-E14D-90E2-EF0328A3E3BC}"/>
+              </a:ext>
+            </a:extLst>
+          </p:cNvPr>
+          <p:cNvSpPr txBox="1"/>
+          <p:nvPr/>
+        </p:nvSpPr>
+        <p:spPr>
+          <a:xfrm>
+            <a:off x="11814388" y="19314032"/>
+            <a:ext cx="821059" cy="477054"/>
+          </a:xfrm>
+          <a:prstGeom prst="rect">
+            <a:avLst/>
+          </a:prstGeom>
+          <a:noFill/>
+        </p:spPr>
+        <p:txBody>
+          <a:bodyPr wrap="none" rtlCol="0">
+            <a:spAutoFit/>
+          </a:bodyPr>
+          <a:lstStyle/>
+          <a:p>
+            <a:r>
+              <a:rPr lang="en-US" sz="2500" dirty="0"/>
+              <a:t>STAR</a:t>
+            </a:r>
+          </a:p>
+        </p:txBody>
+      </p:sp>
+      <p:cxnSp>
+        <p:nvCxnSpPr>
+          <p:cNvPr id="76" name="Straight Arrow Connector 75">
+            <a:extLst>
+              <a:ext uri="{FF2B5EF4-FFF2-40B4-BE49-F238E27FC236}">
+                <a16:creationId xmlns:a16="http://schemas.microsoft.com/office/drawing/2014/main" id="{14A50CDE-9303-8342-996F-2DF592442155}"/>
+              </a:ext>
+            </a:extLst>
+          </p:cNvPr>
+          <p:cNvCxnSpPr>
+            <a:cxnSpLocks/>
+          </p:cNvCxnSpPr>
+          <p:nvPr/>
+        </p:nvCxnSpPr>
+        <p:spPr>
+          <a:xfrm>
+            <a:off x="14658109" y="22555200"/>
+            <a:ext cx="214338" cy="259527"/>
+          </a:xfrm>
+          <a:prstGeom prst="straightConnector1">
+            <a:avLst/>
+          </a:prstGeom>
+          <a:ln>
+            <a:tailEnd type="triangle"/>
+          </a:ln>
+        </p:spPr>
+        <p:style>
+          <a:lnRef idx="1">
+            <a:schemeClr val="dk1"/>
+          </a:lnRef>
+          <a:fillRef idx="0">
+            <a:schemeClr val="dk1"/>
+          </a:fillRef>
+          <a:effectRef idx="0">
+            <a:schemeClr val="dk1"/>
+          </a:effectRef>
+          <a:fontRef idx="minor">
+            <a:schemeClr val="tx1"/>
+          </a:fontRef>
+        </p:style>
+      </p:cxnSp>
+      <p:sp>
+        <p:nvSpPr>
+          <p:cNvPr id="80" name="TextBox 79">
+            <a:extLst>
+              <a:ext uri="{FF2B5EF4-FFF2-40B4-BE49-F238E27FC236}">
+                <a16:creationId xmlns:a16="http://schemas.microsoft.com/office/drawing/2014/main" id="{AD19092A-E39F-084B-B07B-9C29EA31596A}"/>
+              </a:ext>
+            </a:extLst>
+          </p:cNvPr>
+          <p:cNvSpPr txBox="1"/>
+          <p:nvPr/>
+        </p:nvSpPr>
+        <p:spPr>
+          <a:xfrm>
+            <a:off x="14178190" y="22198094"/>
+            <a:ext cx="1912318" cy="477054"/>
+          </a:xfrm>
+          <a:prstGeom prst="rect">
+            <a:avLst/>
+          </a:prstGeom>
+          <a:noFill/>
+        </p:spPr>
+        <p:txBody>
+          <a:bodyPr wrap="none" rtlCol="0">
+            <a:spAutoFit/>
+          </a:bodyPr>
+          <a:lstStyle/>
+          <a:p>
+            <a:r>
+              <a:rPr lang="en-US" sz="2500" dirty="0" err="1"/>
+              <a:t>Trimmomatic</a:t>
+            </a:r>
+            <a:endParaRPr lang="en-US" sz="2500" dirty="0"/>
+          </a:p>
+        </p:txBody>
+      </p:sp>
+      <p:cxnSp>
+        <p:nvCxnSpPr>
+          <p:cNvPr id="83" name="Straight Arrow Connector 82">
+            <a:extLst>
+              <a:ext uri="{FF2B5EF4-FFF2-40B4-BE49-F238E27FC236}">
+                <a16:creationId xmlns:a16="http://schemas.microsoft.com/office/drawing/2014/main" id="{C8EFEF45-61D9-9D4E-A0AE-9FDD0A801478}"/>
+              </a:ext>
+            </a:extLst>
+          </p:cNvPr>
+          <p:cNvCxnSpPr>
+            <a:cxnSpLocks/>
+          </p:cNvCxnSpPr>
+          <p:nvPr/>
+        </p:nvCxnSpPr>
+        <p:spPr>
+          <a:xfrm flipH="1">
+            <a:off x="13754062" y="23154245"/>
+            <a:ext cx="308302" cy="0"/>
+          </a:xfrm>
+          <a:prstGeom prst="straightConnector1">
+            <a:avLst/>
+          </a:prstGeom>
+          <a:ln>
+            <a:tailEnd type="triangle"/>
+          </a:ln>
+        </p:spPr>
+        <p:style>
+          <a:lnRef idx="1">
+            <a:schemeClr val="dk1"/>
+          </a:lnRef>
+          <a:fillRef idx="0">
+            <a:schemeClr val="dk1"/>
+          </a:fillRef>
+          <a:effectRef idx="0">
+            <a:schemeClr val="dk1"/>
+          </a:effectRef>
+          <a:fontRef idx="minor">
+            <a:schemeClr val="tx1"/>
+          </a:fontRef>
+        </p:style>
+      </p:cxnSp>
+      <p:sp>
+        <p:nvSpPr>
+          <p:cNvPr id="85" name="TextBox 84">
+            <a:extLst>
+              <a:ext uri="{FF2B5EF4-FFF2-40B4-BE49-F238E27FC236}">
+                <a16:creationId xmlns:a16="http://schemas.microsoft.com/office/drawing/2014/main" id="{6DADC516-874C-8F4B-B043-EE300528702D}"/>
+              </a:ext>
+            </a:extLst>
+          </p:cNvPr>
+          <p:cNvSpPr txBox="1"/>
+          <p:nvPr/>
+        </p:nvSpPr>
+        <p:spPr>
+          <a:xfrm>
+            <a:off x="14030208" y="22889737"/>
+            <a:ext cx="1379224" cy="477054"/>
+          </a:xfrm>
+          <a:prstGeom prst="rect">
+            <a:avLst/>
+          </a:prstGeom>
+          <a:noFill/>
+        </p:spPr>
+        <p:txBody>
+          <a:bodyPr wrap="none" rtlCol="0">
+            <a:spAutoFit/>
+          </a:bodyPr>
+          <a:lstStyle/>
+          <a:p>
+            <a:r>
+              <a:rPr lang="en-US" sz="2500" dirty="0" err="1"/>
+              <a:t>Samtools</a:t>
+            </a:r>
+            <a:endParaRPr lang="en-US" sz="2500" dirty="0"/>
+          </a:p>
+        </p:txBody>
+      </p:sp>
+      <p:cxnSp>
+        <p:nvCxnSpPr>
+          <p:cNvPr id="86" name="Straight Arrow Connector 85">
+            <a:extLst>
+              <a:ext uri="{FF2B5EF4-FFF2-40B4-BE49-F238E27FC236}">
+                <a16:creationId xmlns:a16="http://schemas.microsoft.com/office/drawing/2014/main" id="{D30C6F6B-6E27-3342-97EB-64ECD1698963}"/>
+              </a:ext>
+            </a:extLst>
+          </p:cNvPr>
+          <p:cNvCxnSpPr>
+            <a:cxnSpLocks/>
+          </p:cNvCxnSpPr>
+          <p:nvPr/>
+        </p:nvCxnSpPr>
+        <p:spPr>
+          <a:xfrm flipH="1">
+            <a:off x="9690627" y="23726187"/>
+            <a:ext cx="308302" cy="0"/>
+          </a:xfrm>
+          <a:prstGeom prst="straightConnector1">
+            <a:avLst/>
+          </a:prstGeom>
+          <a:ln>
+            <a:tailEnd type="triangle"/>
+          </a:ln>
+        </p:spPr>
+        <p:style>
+          <a:lnRef idx="1">
+            <a:schemeClr val="dk1"/>
+          </a:lnRef>
+          <a:fillRef idx="0">
+            <a:schemeClr val="dk1"/>
+          </a:fillRef>
+          <a:effectRef idx="0">
+            <a:schemeClr val="dk1"/>
+          </a:effectRef>
+          <a:fontRef idx="minor">
+            <a:schemeClr val="tx1"/>
+          </a:fontRef>
+        </p:style>
+      </p:cxnSp>
+      <p:sp>
+        <p:nvSpPr>
+          <p:cNvPr id="87" name="TextBox 86">
+            <a:extLst>
+              <a:ext uri="{FF2B5EF4-FFF2-40B4-BE49-F238E27FC236}">
+                <a16:creationId xmlns:a16="http://schemas.microsoft.com/office/drawing/2014/main" id="{69E4875C-D86C-7D43-8A43-E607D01B125F}"/>
+              </a:ext>
+            </a:extLst>
+          </p:cNvPr>
+          <p:cNvSpPr txBox="1"/>
+          <p:nvPr/>
+        </p:nvSpPr>
+        <p:spPr>
+          <a:xfrm>
+            <a:off x="9966773" y="23461679"/>
+            <a:ext cx="1001556" cy="477054"/>
+          </a:xfrm>
+          <a:prstGeom prst="rect">
+            <a:avLst/>
+          </a:prstGeom>
+          <a:noFill/>
+        </p:spPr>
+        <p:txBody>
+          <a:bodyPr wrap="none" rtlCol="0">
+            <a:spAutoFit/>
+          </a:bodyPr>
+          <a:lstStyle/>
+          <a:p>
+            <a:r>
+              <a:rPr lang="en-US" sz="2500" dirty="0"/>
+              <a:t>Trinity</a:t>
+            </a:r>
+          </a:p>
+        </p:txBody>
+      </p:sp>
+      <p:cxnSp>
+        <p:nvCxnSpPr>
+          <p:cNvPr id="88" name="Straight Arrow Connector 87">
+            <a:extLst>
+              <a:ext uri="{FF2B5EF4-FFF2-40B4-BE49-F238E27FC236}">
+                <a16:creationId xmlns:a16="http://schemas.microsoft.com/office/drawing/2014/main" id="{521E942E-30E2-FD4A-9F81-B24F4E85BD2D}"/>
+              </a:ext>
+            </a:extLst>
+          </p:cNvPr>
+          <p:cNvCxnSpPr>
+            <a:cxnSpLocks/>
+          </p:cNvCxnSpPr>
+          <p:nvPr/>
+        </p:nvCxnSpPr>
+        <p:spPr>
+          <a:xfrm flipH="1">
+            <a:off x="9568823" y="23331916"/>
+            <a:ext cx="397950" cy="167672"/>
+          </a:xfrm>
+          <a:prstGeom prst="straightConnector1">
+            <a:avLst/>
+          </a:prstGeom>
+          <a:ln>
+            <a:tailEnd type="triangle"/>
+          </a:ln>
+        </p:spPr>
+        <p:style>
+          <a:lnRef idx="1">
+            <a:schemeClr val="dk1"/>
+          </a:lnRef>
+          <a:fillRef idx="0">
+            <a:schemeClr val="dk1"/>
+          </a:fillRef>
+          <a:effectRef idx="0">
+            <a:schemeClr val="dk1"/>
+          </a:effectRef>
+          <a:fontRef idx="minor">
+            <a:schemeClr val="tx1"/>
+          </a:fontRef>
+        </p:style>
+      </p:cxnSp>
+      <p:sp>
+        <p:nvSpPr>
+          <p:cNvPr id="89" name="TextBox 88">
+            <a:extLst>
+              <a:ext uri="{FF2B5EF4-FFF2-40B4-BE49-F238E27FC236}">
+                <a16:creationId xmlns:a16="http://schemas.microsoft.com/office/drawing/2014/main" id="{45AE74DF-C21B-EA48-A8C0-FFC285108ECA}"/>
+              </a:ext>
+            </a:extLst>
+          </p:cNvPr>
+          <p:cNvSpPr txBox="1"/>
+          <p:nvPr/>
+        </p:nvSpPr>
+        <p:spPr>
+          <a:xfrm>
+            <a:off x="9966773" y="23064537"/>
+            <a:ext cx="1300677" cy="477054"/>
+          </a:xfrm>
+          <a:prstGeom prst="rect">
+            <a:avLst/>
+          </a:prstGeom>
+          <a:noFill/>
+        </p:spPr>
+        <p:txBody>
+          <a:bodyPr wrap="none" rtlCol="0">
+            <a:spAutoFit/>
+          </a:bodyPr>
+          <a:lstStyle/>
+          <a:p>
+            <a:r>
+              <a:rPr lang="en-US" sz="2500" dirty="0"/>
+              <a:t>Cufflinks</a:t>
+            </a:r>
+          </a:p>
+        </p:txBody>
+      </p:sp>
+      <p:cxnSp>
+        <p:nvCxnSpPr>
+          <p:cNvPr id="93" name="Straight Arrow Connector 92">
+            <a:extLst>
+              <a:ext uri="{FF2B5EF4-FFF2-40B4-BE49-F238E27FC236}">
+                <a16:creationId xmlns:a16="http://schemas.microsoft.com/office/drawing/2014/main" id="{F019CCA5-A699-5E48-9BE6-82E7E55E9B0F}"/>
+              </a:ext>
+            </a:extLst>
+          </p:cNvPr>
+          <p:cNvCxnSpPr>
+            <a:cxnSpLocks/>
+          </p:cNvCxnSpPr>
+          <p:nvPr/>
+        </p:nvCxnSpPr>
+        <p:spPr>
+          <a:xfrm flipH="1">
+            <a:off x="9662918" y="25320225"/>
+            <a:ext cx="308302" cy="0"/>
+          </a:xfrm>
+          <a:prstGeom prst="straightConnector1">
+            <a:avLst/>
+          </a:prstGeom>
+          <a:ln>
+            <a:tailEnd type="triangle"/>
+          </a:ln>
+        </p:spPr>
+        <p:style>
+          <a:lnRef idx="1">
+            <a:schemeClr val="dk1"/>
+          </a:lnRef>
+          <a:fillRef idx="0">
+            <a:schemeClr val="dk1"/>
+          </a:fillRef>
+          <a:effectRef idx="0">
+            <a:schemeClr val="dk1"/>
+          </a:effectRef>
+          <a:fontRef idx="minor">
+            <a:schemeClr val="tx1"/>
+          </a:fontRef>
+        </p:style>
+      </p:cxnSp>
+      <p:sp>
+        <p:nvSpPr>
+          <p:cNvPr id="94" name="TextBox 93">
+            <a:extLst>
+              <a:ext uri="{FF2B5EF4-FFF2-40B4-BE49-F238E27FC236}">
+                <a16:creationId xmlns:a16="http://schemas.microsoft.com/office/drawing/2014/main" id="{BF02D524-914E-AD48-9794-28A15008C541}"/>
+              </a:ext>
+            </a:extLst>
+          </p:cNvPr>
+          <p:cNvSpPr txBox="1"/>
+          <p:nvPr/>
+        </p:nvSpPr>
+        <p:spPr>
+          <a:xfrm>
+            <a:off x="9939064" y="25055717"/>
+            <a:ext cx="2045753" cy="477054"/>
+          </a:xfrm>
+          <a:prstGeom prst="rect">
+            <a:avLst/>
+          </a:prstGeom>
+          <a:noFill/>
+        </p:spPr>
+        <p:txBody>
+          <a:bodyPr wrap="none" rtlCol="0">
+            <a:spAutoFit/>
+          </a:bodyPr>
+          <a:lstStyle/>
+          <a:p>
+            <a:r>
+              <a:rPr lang="en-US" sz="2500" dirty="0" err="1"/>
+              <a:t>CummeRbund</a:t>
+            </a:r>
+            <a:endParaRPr lang="en-US" sz="2500" dirty="0"/>
+          </a:p>
+        </p:txBody>
+      </p:sp>
+    </p:spTree>
+    <p:extLst>
+      <p:ext uri="{BB962C8B-B14F-4D97-AF65-F5344CB8AC3E}">
+        <p14:creationId xmlns:p14="http://schemas.microsoft.com/office/powerpoint/2010/main" val="1330808473"/>
+      </p:ext>
+    </p:extLst>
+  </p:cSld>
+  <p:clrMapOvr>
+    <a:masterClrMapping/>
+  </p:clrMapOvr>
+</p:sld>
+</file>
+
 <file path=ppt/theme/theme1.xml><?xml version="1.0" encoding="utf-8"?>
 <a:theme xmlns:a="http://schemas.openxmlformats.org/drawingml/2006/main" name="Office Theme">
   <a:themeElements>

</xml_diff>